<commit_message>
futzing with node colors
</commit_message>
<xml_diff>
--- a/presentations/networks_ssces_jan2020.pptx
+++ b/presentations/networks_ssces_jan2020.pptx
@@ -275,7 +275,7 @@
           <a:p>
             <a:fld id="{B6E6108D-271E-0C44-A5FC-9B5738276C12}" type="datetimeFigureOut">
               <a:rPr lang="en-US" smtClean="0"/>
-              <a:t>1/7/21</a:t>
+              <a:t>1/8/21</a:t>
             </a:fld>
             <a:endParaRPr lang="en-US"/>
           </a:p>
@@ -473,7 +473,7 @@
           <a:p>
             <a:fld id="{B6E6108D-271E-0C44-A5FC-9B5738276C12}" type="datetimeFigureOut">
               <a:rPr lang="en-US" smtClean="0"/>
-              <a:t>1/7/21</a:t>
+              <a:t>1/8/21</a:t>
             </a:fld>
             <a:endParaRPr lang="en-US"/>
           </a:p>
@@ -681,7 +681,7 @@
           <a:p>
             <a:fld id="{B6E6108D-271E-0C44-A5FC-9B5738276C12}" type="datetimeFigureOut">
               <a:rPr lang="en-US" smtClean="0"/>
-              <a:t>1/7/21</a:t>
+              <a:t>1/8/21</a:t>
             </a:fld>
             <a:endParaRPr lang="en-US"/>
           </a:p>
@@ -879,7 +879,7 @@
           <a:p>
             <a:fld id="{B6E6108D-271E-0C44-A5FC-9B5738276C12}" type="datetimeFigureOut">
               <a:rPr lang="en-US" smtClean="0"/>
-              <a:t>1/7/21</a:t>
+              <a:t>1/8/21</a:t>
             </a:fld>
             <a:endParaRPr lang="en-US"/>
           </a:p>
@@ -1154,7 +1154,7 @@
           <a:p>
             <a:fld id="{B6E6108D-271E-0C44-A5FC-9B5738276C12}" type="datetimeFigureOut">
               <a:rPr lang="en-US" smtClean="0"/>
-              <a:t>1/7/21</a:t>
+              <a:t>1/8/21</a:t>
             </a:fld>
             <a:endParaRPr lang="en-US"/>
           </a:p>
@@ -1419,7 +1419,7 @@
           <a:p>
             <a:fld id="{B6E6108D-271E-0C44-A5FC-9B5738276C12}" type="datetimeFigureOut">
               <a:rPr lang="en-US" smtClean="0"/>
-              <a:t>1/7/21</a:t>
+              <a:t>1/8/21</a:t>
             </a:fld>
             <a:endParaRPr lang="en-US"/>
           </a:p>
@@ -1831,7 +1831,7 @@
           <a:p>
             <a:fld id="{B6E6108D-271E-0C44-A5FC-9B5738276C12}" type="datetimeFigureOut">
               <a:rPr lang="en-US" smtClean="0"/>
-              <a:t>1/7/21</a:t>
+              <a:t>1/8/21</a:t>
             </a:fld>
             <a:endParaRPr lang="en-US"/>
           </a:p>
@@ -1972,7 +1972,7 @@
           <a:p>
             <a:fld id="{B6E6108D-271E-0C44-A5FC-9B5738276C12}" type="datetimeFigureOut">
               <a:rPr lang="en-US" smtClean="0"/>
-              <a:t>1/7/21</a:t>
+              <a:t>1/8/21</a:t>
             </a:fld>
             <a:endParaRPr lang="en-US"/>
           </a:p>
@@ -2085,7 +2085,7 @@
           <a:p>
             <a:fld id="{B6E6108D-271E-0C44-A5FC-9B5738276C12}" type="datetimeFigureOut">
               <a:rPr lang="en-US" smtClean="0"/>
-              <a:t>1/7/21</a:t>
+              <a:t>1/8/21</a:t>
             </a:fld>
             <a:endParaRPr lang="en-US"/>
           </a:p>
@@ -2396,7 +2396,7 @@
           <a:p>
             <a:fld id="{B6E6108D-271E-0C44-A5FC-9B5738276C12}" type="datetimeFigureOut">
               <a:rPr lang="en-US" smtClean="0"/>
-              <a:t>1/7/21</a:t>
+              <a:t>1/8/21</a:t>
             </a:fld>
             <a:endParaRPr lang="en-US"/>
           </a:p>
@@ -2684,7 +2684,7 @@
           <a:p>
             <a:fld id="{B6E6108D-271E-0C44-A5FC-9B5738276C12}" type="datetimeFigureOut">
               <a:rPr lang="en-US" smtClean="0"/>
-              <a:t>1/7/21</a:t>
+              <a:t>1/8/21</a:t>
             </a:fld>
             <a:endParaRPr lang="en-US"/>
           </a:p>
@@ -2925,7 +2925,7 @@
           <a:p>
             <a:fld id="{B6E6108D-271E-0C44-A5FC-9B5738276C12}" type="datetimeFigureOut">
               <a:rPr lang="en-US" smtClean="0"/>
-              <a:t>1/7/21</a:t>
+              <a:t>1/8/21</a:t>
             </a:fld>
             <a:endParaRPr lang="en-US"/>
           </a:p>
@@ -3929,6 +3929,36 @@
           </a:prstGeom>
         </p:spPr>
       </p:pic>
+      <p:pic>
+        <p:nvPicPr>
+          <p:cNvPr id="8" name="Picture 7">
+            <a:extLst>
+              <a:ext uri="{FF2B5EF4-FFF2-40B4-BE49-F238E27FC236}">
+                <a16:creationId xmlns:a16="http://schemas.microsoft.com/office/drawing/2014/main" id="{B2BC84FE-0A05-D640-B3AE-A0B5BAC77F93}"/>
+              </a:ext>
+            </a:extLst>
+          </p:cNvPr>
+          <p:cNvPicPr>
+            <a:picLocks noChangeAspect="1"/>
+          </p:cNvPicPr>
+          <p:nvPr/>
+        </p:nvPicPr>
+        <p:blipFill>
+          <a:blip r:embed="rId6"/>
+          <a:stretch>
+            <a:fillRect/>
+          </a:stretch>
+        </p:blipFill>
+        <p:spPr>
+          <a:xfrm>
+            <a:off x="4856023" y="2668990"/>
+            <a:ext cx="3048000" cy="3048000"/>
+          </a:xfrm>
+          <a:prstGeom prst="rect">
+            <a:avLst/>
+          </a:prstGeom>
+        </p:spPr>
+      </p:pic>
     </p:spTree>
     <p:extLst>
       <p:ext uri="{BB962C8B-B14F-4D97-AF65-F5344CB8AC3E}">

</xml_diff>